<commit_message>
Save progress on module 07.
</commit_message>
<xml_diff>
--- a/workshop/07_Performance_as_a_Self_Service/ACMWorkshop_Performance_as_a_Self_Service.pptx
+++ b/workshop/07_Performance_as_a_Self_Service/ACMWorkshop_Performance_as_a_Self_Service.pptx
@@ -28867,30 +28867,6 @@
 </file>
 
 <file path=customXml/item1.xml><?xml version="1.0" encoding="utf-8"?>
-<p:properties xmlns:p="http://schemas.microsoft.com/office/2006/metadata/properties" xmlns:xsi="http://www.w3.org/2001/XMLSchema-instance" xmlns:pc="http://schemas.microsoft.com/office/infopath/2007/PartnerControls">
-  <documentManagement>
-    <SharedWithUsers xmlns="fb8203b4-fe31-4bd3-bf6e-7d3582ff5478">
-      <UserInfo>
-        <DisplayName>Anderson, Dave (Marketing)</DisplayName>
-        <AccountId>14</AccountId>
-        <AccountType/>
-      </UserInfo>
-      <UserInfo>
-        <DisplayName>Sims, Josh</DisplayName>
-        <AccountId>473</AccountId>
-        <AccountType/>
-      </UserInfo>
-      <UserInfo>
-        <DisplayName>Ward, Frances</DisplayName>
-        <AccountId>6</AccountId>
-        <AccountType/>
-      </UserInfo>
-    </SharedWithUsers>
-  </documentManagement>
-</p:properties>
-</file>
-
-<file path=customXml/item2.xml><?xml version="1.0" encoding="utf-8"?>
 <ct:contentTypeSchema xmlns:ct="http://schemas.microsoft.com/office/2006/metadata/contentType" xmlns:ma="http://schemas.microsoft.com/office/2006/metadata/properties/metaAttributes" ct:_="" ma:_="" ma:contentTypeName="Document" ma:contentTypeID="0x01010052F8FE65E80A8C4791DDD83E290982FE" ma:contentTypeVersion="7" ma:contentTypeDescription="Create a new document." ma:contentTypeScope="" ma:versionID="b30853a293787791d003978af993c376">
   <xsd:schema xmlns:xsd="http://www.w3.org/2001/XMLSchema" xmlns:xs="http://www.w3.org/2001/XMLSchema" xmlns:p="http://schemas.microsoft.com/office/2006/metadata/properties" xmlns:ns2="975ecbaa-750d-4684-9d6f-dde56c91f74c" xmlns:ns3="fb8203b4-fe31-4bd3-bf6e-7d3582ff5478" targetNamespace="http://schemas.microsoft.com/office/2006/metadata/properties" ma:root="true" ma:fieldsID="5e40e46a27d0028b3013f1b95e4bf97f" ns2:_="" ns3:_="">
     <xsd:import namespace="975ecbaa-750d-4684-9d6f-dde56c91f74c"/>
@@ -29073,6 +29049,30 @@
 </ct:contentTypeSchema>
 </file>
 
+<file path=customXml/item2.xml><?xml version="1.0" encoding="utf-8"?>
+<p:properties xmlns:p="http://schemas.microsoft.com/office/2006/metadata/properties" xmlns:xsi="http://www.w3.org/2001/XMLSchema-instance" xmlns:pc="http://schemas.microsoft.com/office/infopath/2007/PartnerControls">
+  <documentManagement>
+    <SharedWithUsers xmlns="fb8203b4-fe31-4bd3-bf6e-7d3582ff5478">
+      <UserInfo>
+        <DisplayName>Anderson, Dave (Marketing)</DisplayName>
+        <AccountId>14</AccountId>
+        <AccountType/>
+      </UserInfo>
+      <UserInfo>
+        <DisplayName>Sims, Josh</DisplayName>
+        <AccountId>473</AccountId>
+        <AccountType/>
+      </UserInfo>
+      <UserInfo>
+        <DisplayName>Ward, Frances</DisplayName>
+        <AccountId>6</AccountId>
+        <AccountType/>
+      </UserInfo>
+    </SharedWithUsers>
+  </documentManagement>
+</p:properties>
+</file>
+
 <file path=customXml/item3.xml><?xml version="1.0" encoding="utf-8"?>
 <?mso-contentType ?>
 <FormTemplates xmlns="http://schemas.microsoft.com/sharepoint/v3/contenttype/forms">
@@ -29083,24 +29083,6 @@
 </file>
 
 <file path=customXml/itemProps1.xml><?xml version="1.0" encoding="utf-8"?>
-<ds:datastoreItem xmlns:ds="http://schemas.openxmlformats.org/officeDocument/2006/customXml" ds:itemID="{363305D2-0ECB-44A0-862C-949F259D46BE}">
-  <ds:schemaRefs>
-    <ds:schemaRef ds:uri="http://schemas.openxmlformats.org/package/2006/metadata/core-properties"/>
-    <ds:schemaRef ds:uri="http://schemas.microsoft.com/office/2006/documentManagement/types"/>
-    <ds:schemaRef ds:uri="http://purl.org/dc/elements/1.1/"/>
-    <ds:schemaRef ds:uri="3e98d6c4-0a6a-4101-aaef-7401c2c41272"/>
-    <ds:schemaRef ds:uri="http://purl.org/dc/terms/"/>
-    <ds:schemaRef ds:uri="http://schemas.microsoft.com/office/infopath/2007/PartnerControls"/>
-    <ds:schemaRef ds:uri="http://www.w3.org/XML/1998/namespace"/>
-    <ds:schemaRef ds:uri="http://purl.org/dc/dcmitype/"/>
-    <ds:schemaRef ds:uri="dd1d8f26-fb76-4973-95d8-1c00742ea3ca"/>
-    <ds:schemaRef ds:uri="http://schemas.microsoft.com/office/2006/metadata/properties"/>
-    <ds:schemaRef ds:uri="fb8203b4-fe31-4bd3-bf6e-7d3582ff5478"/>
-  </ds:schemaRefs>
-</ds:datastoreItem>
-</file>
-
-<file path=customXml/itemProps2.xml><?xml version="1.0" encoding="utf-8"?>
 <ds:datastoreItem xmlns:ds="http://schemas.openxmlformats.org/officeDocument/2006/customXml" ds:itemID="{1EE47AD0-FCDF-4085-9910-14F462509153}">
   <ds:schemaRefs>
     <ds:schemaRef ds:uri="http://schemas.microsoft.com/office/2006/metadata/contentType"/>
@@ -29119,6 +29101,24 @@
 </ds:datastoreItem>
 </file>
 
+<file path=customXml/itemProps2.xml><?xml version="1.0" encoding="utf-8"?>
+<ds:datastoreItem xmlns:ds="http://schemas.openxmlformats.org/officeDocument/2006/customXml" ds:itemID="{363305D2-0ECB-44A0-862C-949F259D46BE}">
+  <ds:schemaRefs>
+    <ds:schemaRef ds:uri="http://schemas.openxmlformats.org/package/2006/metadata/core-properties"/>
+    <ds:schemaRef ds:uri="http://schemas.microsoft.com/office/2006/documentManagement/types"/>
+    <ds:schemaRef ds:uri="http://purl.org/dc/elements/1.1/"/>
+    <ds:schemaRef ds:uri="3e98d6c4-0a6a-4101-aaef-7401c2c41272"/>
+    <ds:schemaRef ds:uri="http://purl.org/dc/terms/"/>
+    <ds:schemaRef ds:uri="http://schemas.microsoft.com/office/infopath/2007/PartnerControls"/>
+    <ds:schemaRef ds:uri="http://www.w3.org/XML/1998/namespace"/>
+    <ds:schemaRef ds:uri="http://purl.org/dc/dcmitype/"/>
+    <ds:schemaRef ds:uri="dd1d8f26-fb76-4973-95d8-1c00742ea3ca"/>
+    <ds:schemaRef ds:uri="http://schemas.microsoft.com/office/2006/metadata/properties"/>
+    <ds:schemaRef ds:uri="fb8203b4-fe31-4bd3-bf6e-7d3582ff5478"/>
+  </ds:schemaRefs>
+</ds:datastoreItem>
+</file>
+
 <file path=customXml/itemProps3.xml><?xml version="1.0" encoding="utf-8"?>
 <ds:datastoreItem xmlns:ds="http://schemas.openxmlformats.org/officeDocument/2006/customXml" ds:itemID="{6075389F-D212-4F19-AFAD-C1BB4FFFE93B}">
   <ds:schemaRefs>

</xml_diff>